<commit_message>
FUNCIONA SEM VARIACOES TUDO EM GPU
</commit_message>
<xml_diff>
--- a/doc/partial presentation/partial_presentation.pptx
+++ b/doc/partial presentation/partial_presentation.pptx
@@ -18,7 +18,7 @@
     <p:sldId id="293" r:id="rId6"/>
     <p:sldId id="292" r:id="rId7"/>
     <p:sldId id="297" r:id="rId8"/>
-    <p:sldId id="298" r:id="rId9"/>
+    <p:sldId id="302" r:id="rId9"/>
     <p:sldId id="281" r:id="rId10"/>
     <p:sldId id="286" r:id="rId11"/>
     <p:sldId id="287" r:id="rId12"/>
@@ -457,11 +457,11 @@
         </c:dLbls>
         <c:gapWidth val="150"/>
         <c:overlap val="100"/>
-        <c:axId val="2094917976"/>
-        <c:axId val="2094920952"/>
+        <c:axId val="2084855464"/>
+        <c:axId val="2084858440"/>
       </c:barChart>
       <c:catAx>
-        <c:axId val="2094917976"/>
+        <c:axId val="2084855464"/>
         <c:scaling>
           <c:orientation val="minMax"/>
         </c:scaling>
@@ -471,7 +471,7 @@
         <c:majorTickMark val="out"/>
         <c:minorTickMark val="none"/>
         <c:tickLblPos val="nextTo"/>
-        <c:crossAx val="2094920952"/>
+        <c:crossAx val="2084858440"/>
         <c:crosses val="autoZero"/>
         <c:auto val="1"/>
         <c:lblAlgn val="ctr"/>
@@ -479,7 +479,7 @@
         <c:noMultiLvlLbl val="0"/>
       </c:catAx>
       <c:valAx>
-        <c:axId val="2094920952"/>
+        <c:axId val="2084858440"/>
         <c:scaling>
           <c:logBase val="2.0"/>
           <c:orientation val="minMax"/>
@@ -521,7 +521,7 @@
         <c:majorTickMark val="out"/>
         <c:minorTickMark val="none"/>
         <c:tickLblPos val="nextTo"/>
-        <c:crossAx val="2094917976"/>
+        <c:crossAx val="2084855464"/>
         <c:crosses val="autoZero"/>
         <c:crossBetween val="between"/>
       </c:valAx>
@@ -828,11 +828,11 @@
         </c:dLbls>
         <c:gapWidth val="150"/>
         <c:overlap val="100"/>
-        <c:axId val="2094989768"/>
-        <c:axId val="2094992744"/>
+        <c:axId val="2103664808"/>
+        <c:axId val="2103661816"/>
       </c:barChart>
       <c:catAx>
-        <c:axId val="2094989768"/>
+        <c:axId val="2103664808"/>
         <c:scaling>
           <c:orientation val="minMax"/>
         </c:scaling>
@@ -842,7 +842,7 @@
         <c:majorTickMark val="out"/>
         <c:minorTickMark val="none"/>
         <c:tickLblPos val="nextTo"/>
-        <c:crossAx val="2094992744"/>
+        <c:crossAx val="2103661816"/>
         <c:crosses val="autoZero"/>
         <c:auto val="1"/>
         <c:lblAlgn val="ctr"/>
@@ -850,7 +850,7 @@
         <c:noMultiLvlLbl val="0"/>
       </c:catAx>
       <c:valAx>
-        <c:axId val="2094992744"/>
+        <c:axId val="2103661816"/>
         <c:scaling>
           <c:orientation val="minMax"/>
         </c:scaling>
@@ -861,7 +861,7 @@
         <c:majorTickMark val="out"/>
         <c:minorTickMark val="none"/>
         <c:tickLblPos val="nextTo"/>
-        <c:crossAx val="2094989768"/>
+        <c:crossAx val="2103664808"/>
         <c:crosses val="autoZero"/>
         <c:crossBetween val="between"/>
       </c:valAx>
@@ -1226,7 +1226,7 @@
                   <c:v>4.815173452312604</c:v>
                 </c:pt>
                 <c:pt idx="6">
-                  <c:v>5.363101148981611</c:v>
+                  <c:v>5.36310114898161</c:v>
                 </c:pt>
                 <c:pt idx="7">
                   <c:v>5.861726526450464</c:v>
@@ -1317,7 +1317,7 @@
                   <c:v>5.511917097166894</c:v>
                 </c:pt>
                 <c:pt idx="5">
-                  <c:v>6.862040162496253</c:v>
+                  <c:v>6.862040162496251</c:v>
                 </c:pt>
                 <c:pt idx="6">
                   <c:v>8.013820791769818</c:v>
@@ -1408,7 +1408,7 @@
                   <c:v>3.730807348525437</c:v>
                 </c:pt>
                 <c:pt idx="4">
-                  <c:v>4.657034017682483</c:v>
+                  <c:v>4.657034017682481</c:v>
                 </c:pt>
                 <c:pt idx="5">
                   <c:v>5.890220720496758</c:v>
@@ -1505,7 +1505,7 @@
                   <c:v>3.855303453437347</c:v>
                 </c:pt>
                 <c:pt idx="5">
-                  <c:v>4.847119716515097</c:v>
+                  <c:v>4.847119716515095</c:v>
                 </c:pt>
                 <c:pt idx="6">
                   <c:v>5.785744295397386</c:v>
@@ -1514,7 +1514,7 @@
                   <c:v>6.402843774006861</c:v>
                 </c:pt>
                 <c:pt idx="8">
-                  <c:v>6.873221603153066</c:v>
+                  <c:v>6.873221603153067</c:v>
                 </c:pt>
                 <c:pt idx="9">
                   <c:v>7.119409511852735</c:v>
@@ -1602,7 +1602,7 @@
                   <c:v>3.092673831891052</c:v>
                 </c:pt>
                 <c:pt idx="6">
-                  <c:v>4.138835099717414</c:v>
+                  <c:v>4.138835099717413</c:v>
                 </c:pt>
                 <c:pt idx="7">
                   <c:v>5.015130450900855</c:v>
@@ -1611,7 +1611,7 @@
                   <c:v>5.77960757933075</c:v>
                 </c:pt>
                 <c:pt idx="9">
-                  <c:v>6.117294617600054</c:v>
+                  <c:v>6.117294617600053</c:v>
                 </c:pt>
               </c:numCache>
             </c:numRef>
@@ -1628,11 +1628,11 @@
         </c:dLbls>
         <c:marker val="1"/>
         <c:smooth val="0"/>
-        <c:axId val="2131090168"/>
-        <c:axId val="2131094536"/>
+        <c:axId val="2124134968"/>
+        <c:axId val="2124139336"/>
       </c:lineChart>
       <c:catAx>
-        <c:axId val="2131090168"/>
+        <c:axId val="2124134968"/>
         <c:scaling>
           <c:orientation val="minMax"/>
         </c:scaling>
@@ -1642,7 +1642,7 @@
         <c:majorTickMark val="out"/>
         <c:minorTickMark val="none"/>
         <c:tickLblPos val="nextTo"/>
-        <c:crossAx val="2131094536"/>
+        <c:crossAx val="2124139336"/>
         <c:crosses val="autoZero"/>
         <c:auto val="1"/>
         <c:lblAlgn val="ctr"/>
@@ -1650,20 +1650,20 @@
         <c:noMultiLvlLbl val="0"/>
       </c:catAx>
       <c:valAx>
-        <c:axId val="2131094536"/>
+        <c:axId val="2124139336"/>
         <c:scaling>
           <c:logBase val="2.0"/>
           <c:orientation val="minMax"/>
           <c:min val="1.0"/>
         </c:scaling>
-        <c:delete val="0"/>
+        <c:delete val="1"/>
         <c:axPos val="l"/>
         <c:majorGridlines/>
         <c:numFmt formatCode="General" sourceLinked="1"/>
         <c:majorTickMark val="out"/>
         <c:minorTickMark val="none"/>
         <c:tickLblPos val="nextTo"/>
-        <c:crossAx val="2131090168"/>
+        <c:crossAx val="2124134968"/>
         <c:crosses val="autoZero"/>
         <c:crossBetween val="between"/>
       </c:valAx>
@@ -1729,9 +1729,9 @@
           <c:layoutTarget val="inner"/>
           <c:xMode val="edge"/>
           <c:yMode val="edge"/>
-          <c:x val="0.0785502444164739"/>
+          <c:x val="0.092875391829198"/>
           <c:y val="0.150087816372269"/>
-          <c:w val="0.882788045546351"/>
+          <c:w val="0.868462698537133"/>
           <c:h val="0.752368133020289"/>
         </c:manualLayout>
       </c:layout>
@@ -2003,7 +2003,7 @@
                   <c:v>1.649207711122983</c:v>
                 </c:pt>
                 <c:pt idx="3">
-                  <c:v>2.17906248440874</c:v>
+                  <c:v>2.179062484408739</c:v>
                 </c:pt>
                 <c:pt idx="4">
                   <c:v>2.666858880715503</c:v>
@@ -2103,13 +2103,13 @@
                   <c:v>3.704698157539512</c:v>
                 </c:pt>
                 <c:pt idx="5">
-                  <c:v>4.62285411625419</c:v>
+                  <c:v>4.622854116254189</c:v>
                 </c:pt>
                 <c:pt idx="6">
                   <c:v>5.330906511624324</c:v>
                 </c:pt>
                 <c:pt idx="7">
-                  <c:v>5.785629162032156</c:v>
+                  <c:v>5.785629162032157</c:v>
                 </c:pt>
                 <c:pt idx="8">
                   <c:v>6.170757133349244</c:v>
@@ -2414,11 +2414,11 @@
         </c:dLbls>
         <c:marker val="1"/>
         <c:smooth val="0"/>
-        <c:axId val="2131145192"/>
-        <c:axId val="2131149592"/>
+        <c:axId val="2103443672"/>
+        <c:axId val="2124647048"/>
       </c:lineChart>
       <c:catAx>
-        <c:axId val="2131145192"/>
+        <c:axId val="2103443672"/>
         <c:scaling>
           <c:orientation val="minMax"/>
         </c:scaling>
@@ -2428,7 +2428,7 @@
         <c:majorTickMark val="out"/>
         <c:minorTickMark val="none"/>
         <c:tickLblPos val="nextTo"/>
-        <c:crossAx val="2131149592"/>
+        <c:crossAx val="2124647048"/>
         <c:crosses val="autoZero"/>
         <c:auto val="1"/>
         <c:lblAlgn val="ctr"/>
@@ -2436,7 +2436,7 @@
         <c:noMultiLvlLbl val="0"/>
       </c:catAx>
       <c:valAx>
-        <c:axId val="2131149592"/>
+        <c:axId val="2124647048"/>
         <c:scaling>
           <c:logBase val="2.0"/>
           <c:orientation val="minMax"/>
@@ -2445,11 +2445,38 @@
         <c:delete val="0"/>
         <c:axPos val="l"/>
         <c:majorGridlines/>
+        <c:title>
+          <c:tx>
+            <c:rich>
+              <a:bodyPr rot="-5400000" vert="horz"/>
+              <a:lstStyle/>
+              <a:p>
+                <a:pPr>
+                  <a:defRPr sz="1200"/>
+                </a:pPr>
+                <a:r>
+                  <a:rPr lang="en-US" sz="1200" dirty="0" smtClean="0"/>
+                  <a:t>Speedup</a:t>
+                </a:r>
+                <a:endParaRPr lang="en-US" sz="1200" dirty="0"/>
+              </a:p>
+            </c:rich>
+          </c:tx>
+          <c:layout>
+            <c:manualLayout>
+              <c:xMode val="edge"/>
+              <c:yMode val="edge"/>
+              <c:x val="0.0"/>
+              <c:y val="0.430061744182241"/>
+            </c:manualLayout>
+          </c:layout>
+          <c:overlay val="0"/>
+        </c:title>
         <c:numFmt formatCode="General" sourceLinked="1"/>
         <c:majorTickMark val="out"/>
         <c:minorTickMark val="none"/>
         <c:tickLblPos val="nextTo"/>
-        <c:crossAx val="2131145192"/>
+        <c:crossAx val="2103443672"/>
         <c:crosses val="autoZero"/>
         <c:crossBetween val="between"/>
       </c:valAx>
@@ -2749,13 +2776,13 @@
                   <c:v>4.248968045435006</c:v>
                 </c:pt>
                 <c:pt idx="5">
-                  <c:v>4.610479276870915</c:v>
+                  <c:v>4.610479276870913</c:v>
                 </c:pt>
                 <c:pt idx="6">
                   <c:v>4.815798769220626</c:v>
                 </c:pt>
                 <c:pt idx="7">
-                  <c:v>4.997148836358369</c:v>
+                  <c:v>4.997148836358368</c:v>
                 </c:pt>
                 <c:pt idx="8">
                   <c:v>5.041998353072417</c:v>
@@ -2829,7 +2856,7 @@
                   <c:v>3.641938675967477</c:v>
                 </c:pt>
                 <c:pt idx="3">
-                  <c:v>5.424076220389015</c:v>
+                  <c:v>5.424076220389014</c:v>
                 </c:pt>
                 <c:pt idx="4">
                   <c:v>7.084079729966697</c:v>
@@ -2838,10 +2865,10 @@
                   <c:v>8.233080969506101</c:v>
                 </c:pt>
                 <c:pt idx="6">
-                  <c:v>9.027228082519668</c:v>
+                  <c:v>9.027228082519667</c:v>
                 </c:pt>
                 <c:pt idx="7">
-                  <c:v>9.478696825442318</c:v>
+                  <c:v>9.47869682544232</c:v>
                 </c:pt>
                 <c:pt idx="8">
                   <c:v>9.673150291870168</c:v>
@@ -2912,10 +2939,10 @@
                   <c:v>2.42693384491279</c:v>
                 </c:pt>
                 <c:pt idx="2">
-                  <c:v>4.18494120976026</c:v>
+                  <c:v>4.184941209760259</c:v>
                 </c:pt>
                 <c:pt idx="3">
-                  <c:v>6.684618670680799</c:v>
+                  <c:v>6.684618670680797</c:v>
                 </c:pt>
                 <c:pt idx="4">
                   <c:v>9.840932084276392</c:v>
@@ -3016,7 +3043,7 @@
                   <c:v>26.23630689523458</c:v>
                 </c:pt>
                 <c:pt idx="8">
-                  <c:v>28.68324294952204</c:v>
+                  <c:v>28.68324294952203</c:v>
                 </c:pt>
                 <c:pt idx="9">
                   <c:v>29.93658979292168</c:v>
@@ -3292,13 +3319,13 @@
                   <c:v>0.956052055376289</c:v>
                 </c:pt>
                 <c:pt idx="1">
-                  <c:v>2.023587851307388</c:v>
+                  <c:v>2.02358785130739</c:v>
                 </c:pt>
                 <c:pt idx="2">
                   <c:v>3.18073801755434</c:v>
                 </c:pt>
                 <c:pt idx="3">
-                  <c:v>6.722246807915519</c:v>
+                  <c:v>6.722246807915518</c:v>
                 </c:pt>
                 <c:pt idx="4">
                   <c:v>11.62581609600833</c:v>
@@ -3418,12 +3445,12 @@
         </c:dLbls>
         <c:gapWidth val="150"/>
         <c:shape val="box"/>
-        <c:axId val="2131248632"/>
-        <c:axId val="2131254376"/>
-        <c:axId val="2131257768"/>
+        <c:axId val="2124213112"/>
+        <c:axId val="2124218856"/>
+        <c:axId val="2124222248"/>
       </c:bar3DChart>
       <c:catAx>
-        <c:axId val="2131248632"/>
+        <c:axId val="2124213112"/>
         <c:scaling>
           <c:orientation val="maxMin"/>
         </c:scaling>
@@ -3439,14 +3466,18 @@
                   <a:defRPr sz="1600"/>
                 </a:pPr>
                 <a:r>
-                  <a:rPr lang="en-US" sz="1600"/>
+                  <a:rPr lang="en-US" sz="1600" dirty="0"/>
                   <a:t>#</a:t>
                 </a:r>
                 <a:r>
-                  <a:rPr lang="en-US" sz="1600" baseline="0"/>
-                  <a:t> dileps</a:t>
+                  <a:rPr lang="en-US" sz="1600" baseline="0" dirty="0"/>
+                  <a:t> </a:t>
                 </a:r>
-                <a:endParaRPr lang="en-US" sz="1600"/>
+                <a:r>
+                  <a:rPr lang="en-US" sz="1600" baseline="0" dirty="0" smtClean="0"/>
+                  <a:t>variations per event</a:t>
+                </a:r>
+                <a:endParaRPr lang="en-US" sz="1600" dirty="0"/>
               </a:p>
             </c:rich>
           </c:tx>
@@ -3454,8 +3485,8 @@
             <c:manualLayout>
               <c:xMode val="edge"/>
               <c:yMode val="edge"/>
-              <c:x val="0.162383509418918"/>
-              <c:y val="0.850025047704692"/>
+              <c:x val="0.111750598026512"/>
+              <c:y val="0.852116568195846"/>
             </c:manualLayout>
           </c:layout>
           <c:overlay val="0"/>
@@ -3478,7 +3509,7 @@
             <a:endParaRPr lang="en-US"/>
           </a:p>
         </c:txPr>
-        <c:crossAx val="2131254376"/>
+        <c:crossAx val="2124218856"/>
         <c:crossesAt val="1.0"/>
         <c:auto val="1"/>
         <c:lblAlgn val="ctr"/>
@@ -3486,7 +3517,7 @@
         <c:noMultiLvlLbl val="0"/>
       </c:catAx>
       <c:valAx>
-        <c:axId val="2131254376"/>
+        <c:axId val="2124218856"/>
         <c:scaling>
           <c:logBase val="2.0"/>
           <c:orientation val="minMax"/>
@@ -3516,12 +3547,12 @@
             <a:endParaRPr lang="en-US"/>
           </a:p>
         </c:txPr>
-        <c:crossAx val="2131248632"/>
+        <c:crossAx val="2124213112"/>
         <c:crosses val="autoZero"/>
         <c:crossBetween val="between"/>
       </c:valAx>
       <c:serAx>
-        <c:axId val="2131257768"/>
+        <c:axId val="2124222248"/>
         <c:scaling>
           <c:orientation val="minMax"/>
         </c:scaling>
@@ -3582,7 +3613,7 @@
             <a:endParaRPr lang="en-US"/>
           </a:p>
         </c:txPr>
-        <c:crossAx val="2131254376"/>
+        <c:crossAx val="2124218856"/>
         <c:crossesAt val="1.0"/>
         <c:tickLblSkip val="1"/>
         <c:tickMarkSkip val="1"/>
@@ -3761,7 +3792,7 @@
                   <c:v>1330.404804296247</c:v>
                 </c:pt>
                 <c:pt idx="6">
-                  <c:v>563.9457251872232</c:v>
+                  <c:v>563.945725187223</c:v>
                 </c:pt>
               </c:numCache>
             </c:numRef>
@@ -3829,7 +3860,7 @@
                   <c:v>1775.183978386872</c:v>
                 </c:pt>
                 <c:pt idx="6">
-                  <c:v>724.8224280359977</c:v>
+                  <c:v>724.8224280359975</c:v>
                 </c:pt>
               </c:numCache>
             </c:numRef>
@@ -4185,7 +4216,7 @@
                   <c:v>2965.427798038787</c:v>
                 </c:pt>
                 <c:pt idx="2">
-                  <c:v>5525.192974617188</c:v>
+                  <c:v>5525.19297461719</c:v>
                 </c:pt>
                 <c:pt idx="3">
                   <c:v>8256.0267107652</c:v>
@@ -4194,7 +4225,7 @@
                   <c:v>7256.892854014498</c:v>
                 </c:pt>
                 <c:pt idx="5">
-                  <c:v>5960.609887048521</c:v>
+                  <c:v>5960.60988704852</c:v>
                 </c:pt>
                 <c:pt idx="6">
                   <c:v>4263.925288897451</c:v>
@@ -4386,10 +4417,10 @@
                   <c:v>8267.390826705623</c:v>
                 </c:pt>
                 <c:pt idx="5">
-                  <c:v>6822.477747861752</c:v>
+                  <c:v>6822.477747861751</c:v>
                 </c:pt>
                 <c:pt idx="6">
-                  <c:v>5736.937695020373</c:v>
+                  <c:v>5736.937695020371</c:v>
                 </c:pt>
               </c:numCache>
             </c:numRef>
@@ -4473,13 +4504,13 @@
                   <c:v>3526.728397583776</c:v>
                 </c:pt>
                 <c:pt idx="2">
-                  <c:v>6421.433035036237</c:v>
+                  <c:v>6421.433035036236</c:v>
                 </c:pt>
                 <c:pt idx="3">
                   <c:v>10041.05809605406</c:v>
                 </c:pt>
                 <c:pt idx="4">
-                  <c:v>8962.715021465548</c:v>
+                  <c:v>8962.715021465547</c:v>
                 </c:pt>
                 <c:pt idx="5">
                   <c:v>6968.238561356246</c:v>
@@ -4501,12 +4532,12 @@
         </c:dLbls>
         <c:gapWidth val="150"/>
         <c:shape val="box"/>
-        <c:axId val="2131345256"/>
-        <c:axId val="2131350984"/>
-        <c:axId val="2131354056"/>
+        <c:axId val="2124323976"/>
+        <c:axId val="2124329704"/>
+        <c:axId val="2124332808"/>
       </c:bar3DChart>
       <c:catAx>
-        <c:axId val="2131345256"/>
+        <c:axId val="2124323976"/>
         <c:scaling>
           <c:orientation val="minMax"/>
         </c:scaling>
@@ -4543,7 +4574,7 @@
         <c:majorTickMark val="out"/>
         <c:minorTickMark val="none"/>
         <c:tickLblPos val="nextTo"/>
-        <c:crossAx val="2131350984"/>
+        <c:crossAx val="2124329704"/>
         <c:crosses val="autoZero"/>
         <c:auto val="1"/>
         <c:lblAlgn val="ctr"/>
@@ -4551,7 +4582,7 @@
         <c:noMultiLvlLbl val="0"/>
       </c:catAx>
       <c:valAx>
-        <c:axId val="2131350984"/>
+        <c:axId val="2124329704"/>
         <c:scaling>
           <c:orientation val="minMax"/>
         </c:scaling>
@@ -4562,12 +4593,12 @@
         <c:majorTickMark val="out"/>
         <c:minorTickMark val="none"/>
         <c:tickLblPos val="nextTo"/>
-        <c:crossAx val="2131345256"/>
+        <c:crossAx val="2124323976"/>
         <c:crosses val="autoZero"/>
         <c:crossBetween val="between"/>
       </c:valAx>
       <c:serAx>
-        <c:axId val="2131354056"/>
+        <c:axId val="2124332808"/>
         <c:scaling>
           <c:orientation val="minMax"/>
         </c:scaling>
@@ -4607,7 +4638,7 @@
         <c:majorTickMark val="out"/>
         <c:minorTickMark val="none"/>
         <c:tickLblPos val="nextTo"/>
-        <c:crossAx val="2131350984"/>
+        <c:crossAx val="2124329704"/>
         <c:crosses val="autoZero"/>
       </c:serAx>
     </c:plotArea>
@@ -4703,7 +4734,7 @@
           <a:p>
             <a:fld id="{6A2E8799-AB43-2B49-B174-EA2922AE8430}" type="datetime1">
               <a:rPr lang="pt-PT" smtClean="0"/>
-              <a:t>03/Jul/13</a:t>
+              <a:t>08/07/13</a:t>
             </a:fld>
             <a:endParaRPr lang="en-US"/>
           </a:p>
@@ -4869,7 +4900,7 @@
           <a:p>
             <a:fld id="{DB45264F-2348-A448-9001-BE25E1EF061F}" type="datetime1">
               <a:rPr lang="pt-PT" smtClean="0"/>
-              <a:t>03/Jul/13</a:t>
+              <a:t>08/07/13</a:t>
             </a:fld>
             <a:endParaRPr lang="en-US"/>
           </a:p>
@@ -6584,7 +6615,7 @@
           <a:p>
             <a:fld id="{698A196A-D1E5-4340-8BE3-B866CF21B8F2}" type="datetime1">
               <a:rPr lang="pt-PT" smtClean="0"/>
-              <a:t>03/Jul/13</a:t>
+              <a:t>08/07/13</a:t>
             </a:fld>
             <a:endParaRPr lang="en-US"/>
           </a:p>
@@ -6775,7 +6806,7 @@
           <a:p>
             <a:fld id="{EA06EC9D-7BE1-BB4B-8BF2-9C3028D32265}" type="datetime1">
               <a:rPr lang="pt-PT" smtClean="0"/>
-              <a:t>03/Jul/13</a:t>
+              <a:t>08/07/13</a:t>
             </a:fld>
             <a:endParaRPr lang="en-US"/>
           </a:p>
@@ -6960,7 +6991,7 @@
           <a:p>
             <a:fld id="{F547368A-8DB1-584C-98BB-A837081FF51B}" type="datetime1">
               <a:rPr lang="pt-PT" smtClean="0"/>
-              <a:t>03/Jul/13</a:t>
+              <a:t>08/07/13</a:t>
             </a:fld>
             <a:endParaRPr lang="en-US"/>
           </a:p>
@@ -7223,7 +7254,7 @@
           <a:p>
             <a:fld id="{6C93BBA0-4CEB-6543-A2C5-55B6B9ACDD71}" type="datetime1">
               <a:rPr lang="pt-PT" smtClean="0"/>
-              <a:t>03/Jul/13</a:t>
+              <a:t>08/07/13</a:t>
             </a:fld>
             <a:endParaRPr lang="en-US"/>
           </a:p>
@@ -7639,7 +7670,7 @@
           <a:p>
             <a:fld id="{AB436747-84A9-2541-AEEB-6D0EB5BA80A6}" type="datetime1">
               <a:rPr lang="pt-PT" smtClean="0"/>
-              <a:t>03/Jul/13</a:t>
+              <a:t>08/07/13</a:t>
             </a:fld>
             <a:endParaRPr lang="en-US"/>
           </a:p>
@@ -7881,7 +7912,7 @@
           <a:p>
             <a:fld id="{94C05F9E-3D3E-4D4C-B397-C26386612109}" type="datetime1">
               <a:rPr lang="pt-PT" smtClean="0"/>
-              <a:t>03/Jul/13</a:t>
+              <a:t>08/07/13</a:t>
             </a:fld>
             <a:endParaRPr lang="en-US"/>
           </a:p>
@@ -8117,7 +8148,7 @@
           <a:p>
             <a:fld id="{8C61650D-5624-F240-8414-01FAD79630CE}" type="datetime1">
               <a:rPr lang="pt-PT" smtClean="0"/>
-              <a:t>03/Jul/13</a:t>
+              <a:t>08/07/13</a:t>
             </a:fld>
             <a:endParaRPr lang="en-US"/>
           </a:p>
@@ -8312,7 +8343,7 @@
           <a:p>
             <a:fld id="{1C769D5D-B1BE-734E-9F7A-7C11301FE3ED}" type="datetime1">
               <a:rPr lang="pt-PT" smtClean="0"/>
-              <a:t>03/Jul/13</a:t>
+              <a:t>08/07/13</a:t>
             </a:fld>
             <a:endParaRPr lang="en-US"/>
           </a:p>
@@ -8410,7 +8441,7 @@
           <a:p>
             <a:fld id="{2C9B0DCB-9A71-4641-9D2C-CD31FD221208}" type="datetime1">
               <a:rPr lang="pt-PT" smtClean="0"/>
-              <a:t>03/Jul/13</a:t>
+              <a:t>08/07/13</a:t>
             </a:fld>
             <a:endParaRPr lang="en-US"/>
           </a:p>
@@ -8546,7 +8577,7 @@
           <a:p>
             <a:fld id="{DA74B8EE-6C65-2D4E-A8C6-BB77A48159F6}" type="datetime1">
               <a:rPr lang="pt-PT" smtClean="0"/>
-              <a:t>03/Jul/13</a:t>
+              <a:t>08/07/13</a:t>
             </a:fld>
             <a:endParaRPr lang="en-US"/>
           </a:p>
@@ -9064,7 +9095,7 @@
           <a:p>
             <a:fld id="{CFB562F7-F8CF-2447-8ED7-A1B5C21E542A}" type="datetime1">
               <a:rPr lang="pt-PT" smtClean="0"/>
-              <a:t>03/Jul/13</a:t>
+              <a:t>08/07/13</a:t>
             </a:fld>
             <a:endParaRPr lang="en-US"/>
           </a:p>
@@ -9325,7 +9356,7 @@
           <a:p>
             <a:fld id="{19F4885C-3C53-1047-BC44-878C9835E565}" type="datetime1">
               <a:rPr lang="pt-PT" smtClean="0"/>
-              <a:t>03/Jul/13</a:t>
+              <a:t>08/07/13</a:t>
             </a:fld>
             <a:endParaRPr lang="en-US"/>
           </a:p>
@@ -10642,15 +10673,7 @@
             </a:pPr>
             <a:r>
               <a:rPr lang="en-US" dirty="0" smtClean="0"/>
-              <a:t>Alternative </a:t>
-            </a:r>
-            <a:r>
-              <a:rPr lang="en-US" dirty="0" smtClean="0"/>
-              <a:t>1a: </a:t>
-            </a:r>
-            <a:r>
-              <a:rPr lang="en-US" dirty="0" smtClean="0"/>
-              <a:t>parallelize </a:t>
+              <a:t>Alternative 1a: parallelize </a:t>
             </a:r>
             <a:r>
               <a:rPr lang="en-US" dirty="0" err="1" smtClean="0"/>
@@ -10669,15 +10692,7 @@
             </a:r>
             <a:r>
               <a:rPr lang="en-US" sz="4000" dirty="0" smtClean="0"/>
-              <a:t>  	  </a:t>
-            </a:r>
-            <a:r>
-              <a:rPr lang="en-US" sz="4000" dirty="0" smtClean="0"/>
-              <a:t>shared memory, </a:t>
-            </a:r>
-            <a:r>
-              <a:rPr lang="en-US" sz="4000" dirty="0" smtClean="0"/>
-              <a:t>no h/w accelerators </a:t>
+              <a:t>  	  shared memory, no h/w accelerators </a:t>
             </a:r>
             <a:endParaRPr lang="en-US" dirty="0"/>
           </a:p>
@@ -10957,7 +10972,7 @@
           <p:nvPr>
             <p:extLst>
               <p:ext uri="{D42A27DB-BD31-4B8C-83A1-F6EECF244321}">
-                <p14:modId xmlns:p14="http://schemas.microsoft.com/office/powerpoint/2010/main" val="1138110177"/>
+                <p14:modId xmlns:p14="http://schemas.microsoft.com/office/powerpoint/2010/main" val="2555353281"/>
               </p:ext>
             </p:extLst>
           </p:nvPr>
@@ -10981,14 +10996,14 @@
           <p:nvPr>
             <p:extLst>
               <p:ext uri="{D42A27DB-BD31-4B8C-83A1-F6EECF244321}">
-                <p14:modId xmlns:p14="http://schemas.microsoft.com/office/powerpoint/2010/main" val="3976229768"/>
+                <p14:modId xmlns:p14="http://schemas.microsoft.com/office/powerpoint/2010/main" val="2650129645"/>
               </p:ext>
             </p:extLst>
           </p:nvPr>
         </p:nvGraphicFramePr>
         <p:xfrm>
-          <a:off x="277812" y="2057745"/>
-          <a:ext cx="4270375" cy="3300068"/>
+          <a:off x="115452" y="2057745"/>
+          <a:ext cx="4432735" cy="3300068"/>
         </p:xfrm>
         <a:graphic>
           <a:graphicData uri="http://schemas.openxmlformats.org/drawingml/2006/chart">
@@ -10998,14 +11013,14 @@
       </p:graphicFrame>
       <p:sp>
         <p:nvSpPr>
-          <p:cNvPr id="5" name="TextBox 4"/>
+          <p:cNvPr id="6" name="TextBox 5"/>
           <p:cNvSpPr txBox="1"/>
           <p:nvPr/>
         </p:nvSpPr>
         <p:spPr>
           <a:xfrm>
-            <a:off x="3445715" y="5778501"/>
-            <a:ext cx="1877249" cy="369332"/>
+            <a:off x="3654352" y="5357813"/>
+            <a:ext cx="1787669" cy="276999"/>
           </a:xfrm>
           <a:prstGeom prst="rect">
             <a:avLst/>
@@ -11019,18 +11034,10 @@
           <a:lstStyle/>
           <a:p>
             <a:r>
-              <a:rPr lang="en-US" dirty="0" smtClean="0">
-                <a:solidFill>
-                  <a:srgbClr val="FF0000"/>
-                </a:solidFill>
-              </a:rPr>
-              <a:t>Y- axis?    X- axis?</a:t>
-            </a:r>
-            <a:endParaRPr lang="en-US" dirty="0">
-              <a:solidFill>
-                <a:srgbClr val="FF0000"/>
-              </a:solidFill>
-            </a:endParaRPr>
+              <a:rPr lang="en-US" sz="1200" b="1" dirty="0" smtClean="0"/>
+              <a:t># of variations per event</a:t>
+            </a:r>
+            <a:endParaRPr lang="en-US" sz="1200" b="1" dirty="0"/>
           </a:p>
         </p:txBody>
       </p:sp>
@@ -11167,7 +11174,7 @@
           <p:nvPr>
             <p:extLst>
               <p:ext uri="{D42A27DB-BD31-4B8C-83A1-F6EECF244321}">
-                <p14:modId xmlns:p14="http://schemas.microsoft.com/office/powerpoint/2010/main" val="3138609508"/>
+                <p14:modId xmlns:p14="http://schemas.microsoft.com/office/powerpoint/2010/main" val="2268528529"/>
               </p:ext>
             </p:extLst>
           </p:nvPr>
@@ -11372,15 +11379,7 @@
             </a:pPr>
             <a:r>
               <a:rPr lang="en-US" dirty="0" smtClean="0"/>
-              <a:t>Alternative </a:t>
-            </a:r>
-            <a:r>
-              <a:rPr lang="en-US" dirty="0" smtClean="0"/>
-              <a:t>1b: </a:t>
-            </a:r>
-            <a:r>
-              <a:rPr lang="en-US" dirty="0" smtClean="0"/>
-              <a:t>parallelize </a:t>
+              <a:t>Alternative 1b: parallelize </a:t>
             </a:r>
             <a:r>
               <a:rPr lang="en-US" dirty="0" err="1" smtClean="0"/>
@@ -11399,15 +11398,7 @@
             </a:r>
             <a:r>
               <a:rPr lang="en-US" sz="4000" dirty="0" smtClean="0"/>
-              <a:t>  	 </a:t>
-            </a:r>
-            <a:r>
-              <a:rPr lang="en-US" sz="4000" dirty="0" smtClean="0"/>
-              <a:t>shared memory, </a:t>
-            </a:r>
-            <a:r>
-              <a:rPr lang="en-US" sz="4000" dirty="0" smtClean="0"/>
-              <a:t>with GPU accelerator </a:t>
+              <a:t>  	 shared memory, with GPU accelerator </a:t>
             </a:r>
             <a:endParaRPr lang="en-US" dirty="0"/>
           </a:p>
@@ -11522,6 +11513,36 @@
             <a:off x="4864" y="2438400"/>
             <a:ext cx="4795736" cy="4419600"/>
           </a:xfrm>
+        </p:spPr>
+      </p:pic>
+      <p:pic>
+        <p:nvPicPr>
+          <p:cNvPr id="9" name="Picture 8" descr="gpu.png"/>
+          <p:cNvPicPr>
+            <a:picLocks noChangeAspect="1"/>
+          </p:cNvPicPr>
+          <p:nvPr/>
+        </p:nvPicPr>
+        <p:blipFill>
+          <a:blip r:embed="rId4">
+            <a:extLst>
+              <a:ext uri="{28A0092B-C50C-407E-A947-70E740481C1C}">
+                <a14:useLocalDpi xmlns:a14="http://schemas.microsoft.com/office/drawing/2010/main" val="0"/>
+              </a:ext>
+            </a:extLst>
+          </a:blip>
+          <a:stretch>
+            <a:fillRect/>
+          </a:stretch>
+        </p:blipFill>
+        <p:spPr>
+          <a:xfrm>
+            <a:off x="6038238" y="2392680"/>
+            <a:ext cx="1377415" cy="4556064"/>
+          </a:xfrm>
+          <a:prstGeom prst="rect">
+            <a:avLst/>
+          </a:prstGeom>
         </p:spPr>
       </p:pic>
     </p:spTree>
@@ -11585,15 +11606,7 @@
             </a:pPr>
             <a:r>
               <a:rPr lang="en-US" dirty="0" smtClean="0"/>
-              <a:t>Alternative </a:t>
-            </a:r>
-            <a:r>
-              <a:rPr lang="en-US" dirty="0" smtClean="0"/>
-              <a:t>1c: </a:t>
-            </a:r>
-            <a:r>
-              <a:rPr lang="en-US" dirty="0" smtClean="0"/>
-              <a:t>parallelize </a:t>
+              <a:t>Alternative 1c: parallelize </a:t>
             </a:r>
             <a:r>
               <a:rPr lang="en-US" dirty="0" err="1" smtClean="0"/>
@@ -11612,15 +11625,7 @@
             </a:r>
             <a:r>
               <a:rPr lang="en-US" sz="4000" dirty="0" smtClean="0"/>
-              <a:t>  	 </a:t>
-            </a:r>
-            <a:r>
-              <a:rPr lang="en-US" sz="4000" dirty="0" smtClean="0"/>
-              <a:t>shared memory, </a:t>
-            </a:r>
-            <a:r>
-              <a:rPr lang="en-US" sz="4000" dirty="0" smtClean="0"/>
-              <a:t>with MIC accelerator </a:t>
+              <a:t>  	 shared memory, with MIC accelerator </a:t>
             </a:r>
             <a:endParaRPr lang="en-US" dirty="0"/>
           </a:p>
@@ -11836,8 +11841,8 @@
         </p:nvSpPr>
         <p:spPr>
           <a:xfrm>
-            <a:off x="609600" y="6038976"/>
-            <a:ext cx="5421083" cy="365125"/>
+            <a:off x="609600" y="5701310"/>
+            <a:ext cx="5421083" cy="702792"/>
           </a:xfrm>
         </p:spPr>
         <p:txBody>
@@ -11846,10 +11851,26 @@
           <a:p>
             <a:pPr algn="l"/>
             <a:r>
-              <a:rPr lang="en-US" dirty="0" smtClean="0"/>
-              <a:t>Comments: work under way by Rafael...</a:t>
-            </a:r>
-            <a:endParaRPr lang="en-US" dirty="0"/>
+              <a:rPr lang="en-US" sz="1800" dirty="0" smtClean="0">
+                <a:solidFill>
+                  <a:schemeClr val="tx1"/>
+                </a:solidFill>
+              </a:rPr>
+              <a:t>Work </a:t>
+            </a:r>
+            <a:r>
+              <a:rPr lang="en-US" sz="1800" dirty="0" smtClean="0">
+                <a:solidFill>
+                  <a:schemeClr val="tx1"/>
+                </a:solidFill>
+              </a:rPr>
+              <a:t>under way by Rafael...</a:t>
+            </a:r>
+            <a:endParaRPr lang="en-US" sz="1800" dirty="0">
+              <a:solidFill>
+                <a:schemeClr val="tx1"/>
+              </a:solidFill>
+            </a:endParaRPr>
           </a:p>
         </p:txBody>
       </p:sp>
@@ -14342,36 +14363,6 @@
           </a:p>
         </p:txBody>
       </p:sp>
-      <p:pic>
-        <p:nvPicPr>
-          <p:cNvPr id="6" name="Content Placeholder 5" descr="graf_abstract_flow_with_kinfit.png"/>
-          <p:cNvPicPr>
-            <a:picLocks noGrp="1" noChangeAspect="1"/>
-          </p:cNvPicPr>
-          <p:nvPr>
-            <p:ph sz="quarter" idx="1"/>
-          </p:nvPr>
-        </p:nvPicPr>
-        <p:blipFill>
-          <a:blip r:embed="rId2">
-            <a:extLst>
-              <a:ext uri="{28A0092B-C50C-407E-A947-70E740481C1C}">
-                <a14:useLocalDpi xmlns:a14="http://schemas.microsoft.com/office/drawing/2010/main" val="0"/>
-              </a:ext>
-            </a:extLst>
-          </a:blip>
-          <a:srcRect l="-31791" r="-31791"/>
-          <a:stretch>
-            <a:fillRect/>
-          </a:stretch>
-        </p:blipFill>
-        <p:spPr>
-          <a:xfrm>
-            <a:off x="-158465" y="1589505"/>
-            <a:ext cx="5912194" cy="3259995"/>
-          </a:xfrm>
-        </p:spPr>
-      </p:pic>
       <p:sp>
         <p:nvSpPr>
           <p:cNvPr id="3" name="TextBox 2"/>
@@ -14401,115 +14392,92 @@
             </a:r>
             <a:r>
               <a:rPr lang="en-US" dirty="0" smtClean="0"/>
-              <a:t> of </a:t>
+              <a:t> </a:t>
+            </a:r>
+            <a:r>
+              <a:rPr lang="en-US" dirty="0" smtClean="0"/>
+              <a:t>of the original </a:t>
             </a:r>
             <a:r>
               <a:rPr lang="en-US" dirty="0" err="1" smtClean="0"/>
-              <a:t>ttH_Dilep</a:t>
+              <a:t>ttH_dilep</a:t>
             </a:r>
             <a:r>
               <a:rPr lang="en-US" dirty="0" smtClean="0"/>
-              <a:t> sequential with no variation</a:t>
+              <a:t> </a:t>
             </a:r>
             <a:r>
               <a:rPr lang="en-US" dirty="0" smtClean="0"/>
-              <a:t>s</a:t>
+              <a:t>with </a:t>
+            </a:r>
+            <a:r>
+              <a:rPr lang="en-US" dirty="0" smtClean="0"/>
+              <a:t>no variations</a:t>
             </a:r>
             <a:endParaRPr lang="en-US" dirty="0"/>
           </a:p>
         </p:txBody>
       </p:sp>
-      <p:sp>
-        <p:nvSpPr>
-          <p:cNvPr id="5" name="Rectangle 4"/>
-          <p:cNvSpPr/>
+      <p:pic>
+        <p:nvPicPr>
+          <p:cNvPr id="9" name="Picture 8" descr="callgraph_start_1 copy.png"/>
+          <p:cNvPicPr>
+            <a:picLocks noChangeAspect="1"/>
+          </p:cNvPicPr>
           <p:nvPr/>
-        </p:nvSpPr>
+        </p:nvPicPr>
+        <p:blipFill>
+          <a:blip r:embed="rId2">
+            <a:extLst>
+              <a:ext uri="{28A0092B-C50C-407E-A947-70E740481C1C}">
+                <a14:useLocalDpi xmlns:a14="http://schemas.microsoft.com/office/drawing/2010/main" val="0"/>
+              </a:ext>
+            </a:extLst>
+          </a:blip>
+          <a:stretch>
+            <a:fillRect/>
+          </a:stretch>
+        </p:blipFill>
         <p:spPr>
           <a:xfrm>
-            <a:off x="922186" y="1779723"/>
-            <a:ext cx="1189135" cy="2038591"/>
+            <a:off x="4107155" y="1987020"/>
+            <a:ext cx="7225123" cy="3262478"/>
           </a:xfrm>
           <a:prstGeom prst="rect">
             <a:avLst/>
           </a:prstGeom>
-          <a:solidFill>
-            <a:srgbClr val="12BB00">
-              <a:alpha val="28000"/>
-            </a:srgbClr>
-          </a:solidFill>
-          <a:ln>
-            <a:solidFill>
-              <a:schemeClr val="tx1"/>
-            </a:solidFill>
-          </a:ln>
         </p:spPr>
-        <p:style>
-          <a:lnRef idx="1">
-            <a:schemeClr val="accent1"/>
-          </a:lnRef>
-          <a:fillRef idx="3">
-            <a:schemeClr val="accent1"/>
-          </a:fillRef>
-          <a:effectRef idx="2">
-            <a:schemeClr val="accent1"/>
-          </a:effectRef>
-          <a:fontRef idx="minor">
-            <a:schemeClr val="lt1"/>
-          </a:fontRef>
-        </p:style>
-        <p:txBody>
-          <a:bodyPr rtlCol="0" anchor="ctr"/>
-          <a:lstStyle/>
-          <a:p>
-            <a:pPr algn="ctr"/>
-            <a:endParaRPr lang="en-US"/>
-          </a:p>
-        </p:txBody>
-      </p:sp>
-      <p:sp>
-        <p:nvSpPr>
-          <p:cNvPr id="7" name="TextBox 6"/>
-          <p:cNvSpPr txBox="1"/>
+      </p:pic>
+      <p:pic>
+        <p:nvPicPr>
+          <p:cNvPr id="11" name="Picture 10" descr="abstract_flow_colorful.png"/>
+          <p:cNvPicPr>
+            <a:picLocks noChangeAspect="1"/>
+          </p:cNvPicPr>
           <p:nvPr/>
-        </p:nvSpPr>
+        </p:nvPicPr>
+        <p:blipFill>
+          <a:blip r:embed="rId3">
+            <a:extLst>
+              <a:ext uri="{28A0092B-C50C-407E-A947-70E740481C1C}">
+                <a14:useLocalDpi xmlns:a14="http://schemas.microsoft.com/office/drawing/2010/main" val="0"/>
+              </a:ext>
+            </a:extLst>
+          </a:blip>
+          <a:stretch>
+            <a:fillRect/>
+          </a:stretch>
+        </p:blipFill>
         <p:spPr>
           <a:xfrm>
-            <a:off x="865561" y="3618259"/>
-            <a:ext cx="1367100" cy="192360"/>
+            <a:off x="0" y="1775689"/>
+            <a:ext cx="4107155" cy="3706819"/>
           </a:xfrm>
           <a:prstGeom prst="rect">
             <a:avLst/>
           </a:prstGeom>
-          <a:noFill/>
         </p:spPr>
-        <p:txBody>
-          <a:bodyPr wrap="square" rtlCol="0">
-            <a:spAutoFit/>
-          </a:bodyPr>
-          <a:lstStyle/>
-          <a:p>
-            <a:r>
-              <a:rPr lang="en-US" sz="650" b="1" dirty="0" err="1" smtClean="0">
-                <a:latin typeface="Courier New"/>
-                <a:cs typeface="Courier New"/>
-              </a:rPr>
-              <a:t>LipMiniAnalysis</a:t>
-            </a:r>
-            <a:r>
-              <a:rPr lang="en-US" sz="650" b="1" dirty="0" smtClean="0">
-                <a:latin typeface="Courier New"/>
-                <a:cs typeface="Courier New"/>
-              </a:rPr>
-              <a:t>::Loop()</a:t>
-            </a:r>
-            <a:endParaRPr lang="en-US" sz="650" b="1" dirty="0">
-              <a:latin typeface="Courier New"/>
-              <a:cs typeface="Courier New"/>
-            </a:endParaRPr>
-          </a:p>
-        </p:txBody>
-      </p:sp>
+      </p:pic>
     </p:spTree>
     <p:extLst>
       <p:ext uri="{BB962C8B-B14F-4D97-AF65-F5344CB8AC3E}">
@@ -14599,36 +14567,6 @@
           </a:p>
         </p:txBody>
       </p:sp>
-      <p:pic>
-        <p:nvPicPr>
-          <p:cNvPr id="6" name="Content Placeholder 5" descr="graf_abstract_flow_with_kinfit.png"/>
-          <p:cNvPicPr>
-            <a:picLocks noGrp="1" noChangeAspect="1"/>
-          </p:cNvPicPr>
-          <p:nvPr>
-            <p:ph sz="quarter" idx="1"/>
-          </p:nvPr>
-        </p:nvPicPr>
-        <p:blipFill>
-          <a:blip r:embed="rId2">
-            <a:extLst>
-              <a:ext uri="{28A0092B-C50C-407E-A947-70E740481C1C}">
-                <a14:useLocalDpi xmlns:a14="http://schemas.microsoft.com/office/drawing/2010/main" val="0"/>
-              </a:ext>
-            </a:extLst>
-          </a:blip>
-          <a:srcRect l="-31791" r="-31791"/>
-          <a:stretch>
-            <a:fillRect/>
-          </a:stretch>
-        </p:blipFill>
-        <p:spPr>
-          <a:xfrm>
-            <a:off x="-158465" y="1589505"/>
-            <a:ext cx="5912194" cy="3259995"/>
-          </a:xfrm>
-        </p:spPr>
-      </p:pic>
       <p:sp>
         <p:nvSpPr>
           <p:cNvPr id="3" name="TextBox 2"/>
@@ -14658,119 +14596,92 @@
             </a:r>
             <a:r>
               <a:rPr lang="en-US" dirty="0" smtClean="0"/>
-              <a:t> of </a:t>
+              <a:t> </a:t>
+            </a:r>
+            <a:r>
+              <a:rPr lang="en-US" dirty="0" smtClean="0"/>
+              <a:t>of the original </a:t>
             </a:r>
             <a:r>
               <a:rPr lang="en-US" dirty="0" err="1" smtClean="0"/>
-              <a:t>ttH_Dilep</a:t>
+              <a:t>ttH_dilep</a:t>
             </a:r>
             <a:r>
               <a:rPr lang="en-US" dirty="0" smtClean="0"/>
-              <a:t> sequential code for 256 variation</a:t>
+              <a:t> </a:t>
             </a:r>
             <a:r>
               <a:rPr lang="en-US" dirty="0" smtClean="0"/>
-              <a:t>s</a:t>
+              <a:t>for 256 variations per combination</a:t>
             </a:r>
             <a:endParaRPr lang="en-US" dirty="0"/>
           </a:p>
         </p:txBody>
       </p:sp>
-      <p:sp>
-        <p:nvSpPr>
-          <p:cNvPr id="5" name="Rectangle 4"/>
-          <p:cNvSpPr/>
+      <p:pic>
+        <p:nvPicPr>
+          <p:cNvPr id="9" name="Picture 8" descr="callgraph_start_1 copy.png"/>
+          <p:cNvPicPr>
+            <a:picLocks noChangeAspect="1"/>
+          </p:cNvPicPr>
           <p:nvPr/>
-        </p:nvSpPr>
+        </p:nvPicPr>
+        <p:blipFill>
+          <a:blip r:embed="rId2">
+            <a:extLst>
+              <a:ext uri="{28A0092B-C50C-407E-A947-70E740481C1C}">
+                <a14:useLocalDpi xmlns:a14="http://schemas.microsoft.com/office/drawing/2010/main" val="0"/>
+              </a:ext>
+            </a:extLst>
+          </a:blip>
+          <a:stretch>
+            <a:fillRect/>
+          </a:stretch>
+        </p:blipFill>
         <p:spPr>
           <a:xfrm>
-            <a:off x="922186" y="1779723"/>
-            <a:ext cx="1189135" cy="2038591"/>
+            <a:off x="4107155" y="1987020"/>
+            <a:ext cx="7225123" cy="3262478"/>
           </a:xfrm>
           <a:prstGeom prst="rect">
             <a:avLst/>
           </a:prstGeom>
-          <a:solidFill>
-            <a:srgbClr val="12BB00">
-              <a:alpha val="28000"/>
-            </a:srgbClr>
-          </a:solidFill>
-          <a:ln>
-            <a:solidFill>
-              <a:schemeClr val="tx1"/>
-            </a:solidFill>
-          </a:ln>
         </p:spPr>
-        <p:style>
-          <a:lnRef idx="1">
-            <a:schemeClr val="accent1"/>
-          </a:lnRef>
-          <a:fillRef idx="3">
-            <a:schemeClr val="accent1"/>
-          </a:fillRef>
-          <a:effectRef idx="2">
-            <a:schemeClr val="accent1"/>
-          </a:effectRef>
-          <a:fontRef idx="minor">
-            <a:schemeClr val="lt1"/>
-          </a:fontRef>
-        </p:style>
-        <p:txBody>
-          <a:bodyPr rtlCol="0" anchor="ctr"/>
-          <a:lstStyle/>
-          <a:p>
-            <a:pPr algn="ctr"/>
-            <a:endParaRPr lang="en-US"/>
-          </a:p>
-        </p:txBody>
-      </p:sp>
-      <p:sp>
-        <p:nvSpPr>
-          <p:cNvPr id="7" name="TextBox 6"/>
-          <p:cNvSpPr txBox="1"/>
+      </p:pic>
+      <p:pic>
+        <p:nvPicPr>
+          <p:cNvPr id="11" name="Picture 10" descr="abstract_flow_colorful.png"/>
+          <p:cNvPicPr>
+            <a:picLocks noChangeAspect="1"/>
+          </p:cNvPicPr>
           <p:nvPr/>
-        </p:nvSpPr>
+        </p:nvPicPr>
+        <p:blipFill>
+          <a:blip r:embed="rId3">
+            <a:extLst>
+              <a:ext uri="{28A0092B-C50C-407E-A947-70E740481C1C}">
+                <a14:useLocalDpi xmlns:a14="http://schemas.microsoft.com/office/drawing/2010/main" val="0"/>
+              </a:ext>
+            </a:extLst>
+          </a:blip>
+          <a:stretch>
+            <a:fillRect/>
+          </a:stretch>
+        </p:blipFill>
         <p:spPr>
           <a:xfrm>
-            <a:off x="865561" y="3618259"/>
-            <a:ext cx="1367100" cy="192360"/>
+            <a:off x="0" y="1775689"/>
+            <a:ext cx="4107155" cy="3706819"/>
           </a:xfrm>
           <a:prstGeom prst="rect">
             <a:avLst/>
           </a:prstGeom>
-          <a:noFill/>
         </p:spPr>
-        <p:txBody>
-          <a:bodyPr wrap="square" rtlCol="0">
-            <a:spAutoFit/>
-          </a:bodyPr>
-          <a:lstStyle/>
-          <a:p>
-            <a:r>
-              <a:rPr lang="en-US" sz="650" b="1" dirty="0" err="1" smtClean="0">
-                <a:latin typeface="Courier New"/>
-                <a:cs typeface="Courier New"/>
-              </a:rPr>
-              <a:t>LipMiniAnalysis</a:t>
-            </a:r>
-            <a:r>
-              <a:rPr lang="en-US" sz="650" b="1" dirty="0" smtClean="0">
-                <a:latin typeface="Courier New"/>
-                <a:cs typeface="Courier New"/>
-              </a:rPr>
-              <a:t>::Loop()</a:t>
-            </a:r>
-            <a:endParaRPr lang="en-US" sz="650" b="1" dirty="0">
-              <a:latin typeface="Courier New"/>
-              <a:cs typeface="Courier New"/>
-            </a:endParaRPr>
-          </a:p>
-        </p:txBody>
-      </p:sp>
+      </p:pic>
     </p:spTree>
     <p:extLst>
       <p:ext uri="{BB962C8B-B14F-4D97-AF65-F5344CB8AC3E}">
-        <p14:creationId xmlns:p14="http://schemas.microsoft.com/office/powerpoint/2010/main" val="2653433998"/>
+        <p14:creationId xmlns:p14="http://schemas.microsoft.com/office/powerpoint/2010/main" val="1431074100"/>
       </p:ext>
     </p:extLst>
   </p:cSld>

</xml_diff>